<commit_message>
Unsure. Pushing furthest local changes
</commit_message>
<xml_diff>
--- a/template.pptx
+++ b/template.pptx
@@ -2,7 +2,7 @@
 <file path=ppt/presentation.xml><?xml version="1.0" encoding="utf-8"?>
 <p:presentation xmlns:a="http://schemas.openxmlformats.org/drawingml/2006/main" xmlns:r="http://schemas.openxmlformats.org/officeDocument/2006/relationships" xmlns:p="http://schemas.openxmlformats.org/presentationml/2006/main" saveSubsetFonts="1">
   <p:sldMasterIdLst>
-    <p:sldMasterId id="2147483648" r:id="rId1"/>
+    <p:sldMasterId id="2147483684" r:id="rId1"/>
   </p:sldMasterIdLst>
   <p:sldIdLst>
     <p:sldId id="256" r:id="rId2"/>
@@ -13,7 +13,7 @@
     <a:defPPr>
       <a:defRPr lang="en-US"/>
     </a:defPPr>
-    <a:lvl1pPr marL="0" algn="l" defTabSz="914400" rtl="0" eaLnBrk="1" latinLnBrk="0" hangingPunct="1">
+    <a:lvl1pPr marL="0" algn="l" defTabSz="457200" rtl="0" eaLnBrk="1" latinLnBrk="0" hangingPunct="1">
       <a:defRPr sz="1800" kern="1200">
         <a:solidFill>
           <a:schemeClr val="tx1"/>
@@ -23,7 +23,7 @@
         <a:cs typeface="+mn-cs"/>
       </a:defRPr>
     </a:lvl1pPr>
-    <a:lvl2pPr marL="457200" algn="l" defTabSz="914400" rtl="0" eaLnBrk="1" latinLnBrk="0" hangingPunct="1">
+    <a:lvl2pPr marL="457200" algn="l" defTabSz="457200" rtl="0" eaLnBrk="1" latinLnBrk="0" hangingPunct="1">
       <a:defRPr sz="1800" kern="1200">
         <a:solidFill>
           <a:schemeClr val="tx1"/>
@@ -33,7 +33,7 @@
         <a:cs typeface="+mn-cs"/>
       </a:defRPr>
     </a:lvl2pPr>
-    <a:lvl3pPr marL="914400" algn="l" defTabSz="914400" rtl="0" eaLnBrk="1" latinLnBrk="0" hangingPunct="1">
+    <a:lvl3pPr marL="914400" algn="l" defTabSz="457200" rtl="0" eaLnBrk="1" latinLnBrk="0" hangingPunct="1">
       <a:defRPr sz="1800" kern="1200">
         <a:solidFill>
           <a:schemeClr val="tx1"/>
@@ -43,7 +43,7 @@
         <a:cs typeface="+mn-cs"/>
       </a:defRPr>
     </a:lvl3pPr>
-    <a:lvl4pPr marL="1371600" algn="l" defTabSz="914400" rtl="0" eaLnBrk="1" latinLnBrk="0" hangingPunct="1">
+    <a:lvl4pPr marL="1371600" algn="l" defTabSz="457200" rtl="0" eaLnBrk="1" latinLnBrk="0" hangingPunct="1">
       <a:defRPr sz="1800" kern="1200">
         <a:solidFill>
           <a:schemeClr val="tx1"/>
@@ -53,7 +53,7 @@
         <a:cs typeface="+mn-cs"/>
       </a:defRPr>
     </a:lvl4pPr>
-    <a:lvl5pPr marL="1828800" algn="l" defTabSz="914400" rtl="0" eaLnBrk="1" latinLnBrk="0" hangingPunct="1">
+    <a:lvl5pPr marL="1828800" algn="l" defTabSz="457200" rtl="0" eaLnBrk="1" latinLnBrk="0" hangingPunct="1">
       <a:defRPr sz="1800" kern="1200">
         <a:solidFill>
           <a:schemeClr val="tx1"/>
@@ -63,7 +63,7 @@
         <a:cs typeface="+mn-cs"/>
       </a:defRPr>
     </a:lvl5pPr>
-    <a:lvl6pPr marL="2286000" algn="l" defTabSz="914400" rtl="0" eaLnBrk="1" latinLnBrk="0" hangingPunct="1">
+    <a:lvl6pPr marL="2286000" algn="l" defTabSz="457200" rtl="0" eaLnBrk="1" latinLnBrk="0" hangingPunct="1">
       <a:defRPr sz="1800" kern="1200">
         <a:solidFill>
           <a:schemeClr val="tx1"/>
@@ -73,7 +73,7 @@
         <a:cs typeface="+mn-cs"/>
       </a:defRPr>
     </a:lvl6pPr>
-    <a:lvl7pPr marL="2743200" algn="l" defTabSz="914400" rtl="0" eaLnBrk="1" latinLnBrk="0" hangingPunct="1">
+    <a:lvl7pPr marL="2743200" algn="l" defTabSz="457200" rtl="0" eaLnBrk="1" latinLnBrk="0" hangingPunct="1">
       <a:defRPr sz="1800" kern="1200">
         <a:solidFill>
           <a:schemeClr val="tx1"/>
@@ -83,7 +83,7 @@
         <a:cs typeface="+mn-cs"/>
       </a:defRPr>
     </a:lvl7pPr>
-    <a:lvl8pPr marL="3200400" algn="l" defTabSz="914400" rtl="0" eaLnBrk="1" latinLnBrk="0" hangingPunct="1">
+    <a:lvl8pPr marL="3200400" algn="l" defTabSz="457200" rtl="0" eaLnBrk="1" latinLnBrk="0" hangingPunct="1">
       <a:defRPr sz="1800" kern="1200">
         <a:solidFill>
           <a:schemeClr val="tx1"/>
@@ -93,7 +93,7 @@
         <a:cs typeface="+mn-cs"/>
       </a:defRPr>
     </a:lvl8pPr>
-    <a:lvl9pPr marL="3657600" algn="l" defTabSz="914400" rtl="0" eaLnBrk="1" latinLnBrk="0" hangingPunct="1">
+    <a:lvl9pPr marL="3657600" algn="l" defTabSz="457200" rtl="0" eaLnBrk="1" latinLnBrk="0" hangingPunct="1">
       <a:defRPr sz="1800" kern="1200">
         <a:solidFill>
           <a:schemeClr val="tx1"/>
@@ -135,13 +135,7 @@
       </p:grpSpPr>
       <p:sp>
         <p:nvSpPr>
-          <p:cNvPr id="2" name="Title 1">
-            <a:extLst>
-              <a:ext uri="{FF2B5EF4-FFF2-40B4-BE49-F238E27FC236}">
-                <a16:creationId xmlns:a16="http://schemas.microsoft.com/office/drawing/2014/main" id="{9628E910-8EB2-488F-B035-270B10D70BCA}"/>
-              </a:ext>
-            </a:extLst>
-          </p:cNvPr>
+          <p:cNvPr id="2" name="Title 1"/>
           <p:cNvSpPr>
             <a:spLocks noGrp="1"/>
           </p:cNvSpPr>
@@ -156,31 +150,24 @@
           </a:xfrm>
         </p:spPr>
         <p:txBody>
-          <a:bodyPr anchor="b">
-            <a:normAutofit/>
-          </a:bodyPr>
+          <a:bodyPr anchor="b"/>
           <a:lstStyle>
             <a:lvl1pPr algn="ctr">
-              <a:defRPr sz="6600"/>
+              <a:defRPr sz="6000"/>
             </a:lvl1pPr>
           </a:lstStyle>
           <a:p>
             <a:r>
-              <a:rPr lang="en-US" dirty="0"/>
+              <a:rPr lang="en-US"/>
               <a:t>Click to edit Master title style</a:t>
             </a:r>
-          </a:p>
-        </p:txBody>
-      </p:sp>
-      <p:sp>
-        <p:nvSpPr>
-          <p:cNvPr id="3" name="Subtitle 2">
-            <a:extLst>
-              <a:ext uri="{FF2B5EF4-FFF2-40B4-BE49-F238E27FC236}">
-                <a16:creationId xmlns:a16="http://schemas.microsoft.com/office/drawing/2014/main" id="{1F1CC255-5D58-4088-B763-4028F3CF923A}"/>
-              </a:ext>
-            </a:extLst>
-          </p:cNvPr>
+            <a:endParaRPr lang="en-US" dirty="0"/>
+          </a:p>
+        </p:txBody>
+      </p:sp>
+      <p:sp>
+        <p:nvSpPr>
+          <p:cNvPr id="3" name="Subtitle 2"/>
           <p:cNvSpPr>
             <a:spLocks noGrp="1"/>
           </p:cNvSpPr>
@@ -239,18 +226,13 @@
               <a:rPr lang="en-US"/>
               <a:t>Click to edit Master subtitle style</a:t>
             </a:r>
-          </a:p>
-        </p:txBody>
-      </p:sp>
-      <p:sp>
-        <p:nvSpPr>
-          <p:cNvPr id="4" name="Date Placeholder 3">
-            <a:extLst>
-              <a:ext uri="{FF2B5EF4-FFF2-40B4-BE49-F238E27FC236}">
-                <a16:creationId xmlns:a16="http://schemas.microsoft.com/office/drawing/2014/main" id="{4D61FA21-607F-4DBF-8C6E-BC52DAC572F4}"/>
-              </a:ext>
-            </a:extLst>
-          </p:cNvPr>
+            <a:endParaRPr lang="en-US" dirty="0"/>
+          </a:p>
+        </p:txBody>
+      </p:sp>
+      <p:sp>
+        <p:nvSpPr>
+          <p:cNvPr id="4" name="Date Placeholder 3"/>
           <p:cNvSpPr>
             <a:spLocks noGrp="1"/>
           </p:cNvSpPr>
@@ -265,7 +247,7 @@
           <a:p>
             <a:fld id="{44E9163E-4A8E-43FD-880A-ABF77447F6CF}" type="datetimeFigureOut">
               <a:rPr lang="en-US" smtClean="0"/>
-              <a:t>9/20/2017</a:t>
+              <a:t>11/15/2017</a:t>
             </a:fld>
             <a:endParaRPr lang="en-US"/>
           </a:p>
@@ -273,13 +255,7 @@
       </p:sp>
       <p:sp>
         <p:nvSpPr>
-          <p:cNvPr id="5" name="Footer Placeholder 4">
-            <a:extLst>
-              <a:ext uri="{FF2B5EF4-FFF2-40B4-BE49-F238E27FC236}">
-                <a16:creationId xmlns:a16="http://schemas.microsoft.com/office/drawing/2014/main" id="{77A2F222-755E-4E7C-AA25-B1681652C5C7}"/>
-              </a:ext>
-            </a:extLst>
-          </p:cNvPr>
+          <p:cNvPr id="5" name="Footer Placeholder 4"/>
           <p:cNvSpPr>
             <a:spLocks noGrp="1"/>
           </p:cNvSpPr>
@@ -298,13 +274,7 @@
       </p:sp>
       <p:sp>
         <p:nvSpPr>
-          <p:cNvPr id="6" name="Slide Number Placeholder 5">
-            <a:extLst>
-              <a:ext uri="{FF2B5EF4-FFF2-40B4-BE49-F238E27FC236}">
-                <a16:creationId xmlns:a16="http://schemas.microsoft.com/office/drawing/2014/main" id="{12969356-351B-43F0-AFD9-30B274706F9E}"/>
-              </a:ext>
-            </a:extLst>
-          </p:cNvPr>
+          <p:cNvPr id="6" name="Slide Number Placeholder 5"/>
           <p:cNvSpPr>
             <a:spLocks noGrp="1"/>
           </p:cNvSpPr>
@@ -328,7 +298,7 @@
     </p:spTree>
     <p:extLst>
       <p:ext uri="{BB962C8B-B14F-4D97-AF65-F5344CB8AC3E}">
-        <p14:creationId xmlns:p14="http://schemas.microsoft.com/office/powerpoint/2010/main" val="3462007402"/>
+        <p14:creationId xmlns:p14="http://schemas.microsoft.com/office/powerpoint/2010/main" val="2225440940"/>
       </p:ext>
     </p:extLst>
   </p:cSld>
@@ -357,13 +327,7 @@
       </p:grpSpPr>
       <p:sp>
         <p:nvSpPr>
-          <p:cNvPr id="2" name="Title 1">
-            <a:extLst>
-              <a:ext uri="{FF2B5EF4-FFF2-40B4-BE49-F238E27FC236}">
-                <a16:creationId xmlns:a16="http://schemas.microsoft.com/office/drawing/2014/main" id="{AAC145A5-12F5-49DB-8EC5-44D0AC535C5E}"/>
-              </a:ext>
-            </a:extLst>
-          </p:cNvPr>
+          <p:cNvPr id="2" name="Title 1"/>
           <p:cNvSpPr>
             <a:spLocks noGrp="1"/>
           </p:cNvSpPr>
@@ -380,18 +344,13 @@
               <a:rPr lang="en-US"/>
               <a:t>Click to edit Master title style</a:t>
             </a:r>
-          </a:p>
-        </p:txBody>
-      </p:sp>
-      <p:sp>
-        <p:nvSpPr>
-          <p:cNvPr id="3" name="Vertical Text Placeholder 2">
-            <a:extLst>
-              <a:ext uri="{FF2B5EF4-FFF2-40B4-BE49-F238E27FC236}">
-                <a16:creationId xmlns:a16="http://schemas.microsoft.com/office/drawing/2014/main" id="{3D230CF9-97A5-4528-A54F-670A394FDAFC}"/>
-              </a:ext>
-            </a:extLst>
-          </p:cNvPr>
+            <a:endParaRPr lang="en-US" dirty="0"/>
+          </a:p>
+        </p:txBody>
+      </p:sp>
+      <p:sp>
+        <p:nvSpPr>
+          <p:cNvPr id="3" name="Vertical Text Placeholder 2"/>
           <p:cNvSpPr>
             <a:spLocks noGrp="1"/>
           </p:cNvSpPr>
@@ -437,18 +396,13 @@
               <a:rPr lang="en-US"/>
               <a:t>Fifth level</a:t>
             </a:r>
-          </a:p>
-        </p:txBody>
-      </p:sp>
-      <p:sp>
-        <p:nvSpPr>
-          <p:cNvPr id="4" name="Date Placeholder 3">
-            <a:extLst>
-              <a:ext uri="{FF2B5EF4-FFF2-40B4-BE49-F238E27FC236}">
-                <a16:creationId xmlns:a16="http://schemas.microsoft.com/office/drawing/2014/main" id="{1142F5B9-00CE-43A6-9FF3-65041C56A139}"/>
-              </a:ext>
-            </a:extLst>
-          </p:cNvPr>
+            <a:endParaRPr lang="en-US" dirty="0"/>
+          </a:p>
+        </p:txBody>
+      </p:sp>
+      <p:sp>
+        <p:nvSpPr>
+          <p:cNvPr id="4" name="Date Placeholder 3"/>
           <p:cNvSpPr>
             <a:spLocks noGrp="1"/>
           </p:cNvSpPr>
@@ -463,7 +417,7 @@
           <a:p>
             <a:fld id="{44E9163E-4A8E-43FD-880A-ABF77447F6CF}" type="datetimeFigureOut">
               <a:rPr lang="en-US" smtClean="0"/>
-              <a:t>9/20/2017</a:t>
+              <a:t>11/15/2017</a:t>
             </a:fld>
             <a:endParaRPr lang="en-US"/>
           </a:p>
@@ -471,13 +425,7 @@
       </p:sp>
       <p:sp>
         <p:nvSpPr>
-          <p:cNvPr id="5" name="Footer Placeholder 4">
-            <a:extLst>
-              <a:ext uri="{FF2B5EF4-FFF2-40B4-BE49-F238E27FC236}">
-                <a16:creationId xmlns:a16="http://schemas.microsoft.com/office/drawing/2014/main" id="{D0D514BB-6B90-4F29-878B-2C44BA41D6CE}"/>
-              </a:ext>
-            </a:extLst>
-          </p:cNvPr>
+          <p:cNvPr id="5" name="Footer Placeholder 4"/>
           <p:cNvSpPr>
             <a:spLocks noGrp="1"/>
           </p:cNvSpPr>
@@ -496,13 +444,7 @@
       </p:sp>
       <p:sp>
         <p:nvSpPr>
-          <p:cNvPr id="6" name="Slide Number Placeholder 5">
-            <a:extLst>
-              <a:ext uri="{FF2B5EF4-FFF2-40B4-BE49-F238E27FC236}">
-                <a16:creationId xmlns:a16="http://schemas.microsoft.com/office/drawing/2014/main" id="{FD0AB3F8-DBAC-48F8-A3A8-41A5EB1A6AEB}"/>
-              </a:ext>
-            </a:extLst>
-          </p:cNvPr>
+          <p:cNvPr id="6" name="Slide Number Placeholder 5"/>
           <p:cNvSpPr>
             <a:spLocks noGrp="1"/>
           </p:cNvSpPr>
@@ -526,7 +468,7 @@
     </p:spTree>
     <p:extLst>
       <p:ext uri="{BB962C8B-B14F-4D97-AF65-F5344CB8AC3E}">
-        <p14:creationId xmlns:p14="http://schemas.microsoft.com/office/powerpoint/2010/main" val="1137612028"/>
+        <p14:creationId xmlns:p14="http://schemas.microsoft.com/office/powerpoint/2010/main" val="2832967601"/>
       </p:ext>
     </p:extLst>
   </p:cSld>
@@ -555,13 +497,7 @@
       </p:grpSpPr>
       <p:sp>
         <p:nvSpPr>
-          <p:cNvPr id="2" name="Vertical Title 1">
-            <a:extLst>
-              <a:ext uri="{FF2B5EF4-FFF2-40B4-BE49-F238E27FC236}">
-                <a16:creationId xmlns:a16="http://schemas.microsoft.com/office/drawing/2014/main" id="{6F45E358-2491-4FEE-87DE-98D8A3D1CD74}"/>
-              </a:ext>
-            </a:extLst>
-          </p:cNvPr>
+          <p:cNvPr id="2" name="Vertical Title 1"/>
           <p:cNvSpPr>
             <a:spLocks noGrp="1"/>
           </p:cNvSpPr>
@@ -583,18 +519,13 @@
               <a:rPr lang="en-US"/>
               <a:t>Click to edit Master title style</a:t>
             </a:r>
-          </a:p>
-        </p:txBody>
-      </p:sp>
-      <p:sp>
-        <p:nvSpPr>
-          <p:cNvPr id="3" name="Vertical Text Placeholder 2">
-            <a:extLst>
-              <a:ext uri="{FF2B5EF4-FFF2-40B4-BE49-F238E27FC236}">
-                <a16:creationId xmlns:a16="http://schemas.microsoft.com/office/drawing/2014/main" id="{27D643C7-456E-4CDF-8EE4-FCF376782660}"/>
-              </a:ext>
-            </a:extLst>
-          </p:cNvPr>
+            <a:endParaRPr lang="en-US" dirty="0"/>
+          </a:p>
+        </p:txBody>
+      </p:sp>
+      <p:sp>
+        <p:nvSpPr>
+          <p:cNvPr id="3" name="Vertical Text Placeholder 2"/>
           <p:cNvSpPr>
             <a:spLocks noGrp="1"/>
           </p:cNvSpPr>
@@ -645,18 +576,13 @@
               <a:rPr lang="en-US"/>
               <a:t>Fifth level</a:t>
             </a:r>
-          </a:p>
-        </p:txBody>
-      </p:sp>
-      <p:sp>
-        <p:nvSpPr>
-          <p:cNvPr id="4" name="Date Placeholder 3">
-            <a:extLst>
-              <a:ext uri="{FF2B5EF4-FFF2-40B4-BE49-F238E27FC236}">
-                <a16:creationId xmlns:a16="http://schemas.microsoft.com/office/drawing/2014/main" id="{0CBA18FA-8800-4BE4-B41E-098FF28B0031}"/>
-              </a:ext>
-            </a:extLst>
-          </p:cNvPr>
+            <a:endParaRPr lang="en-US" dirty="0"/>
+          </a:p>
+        </p:txBody>
+      </p:sp>
+      <p:sp>
+        <p:nvSpPr>
+          <p:cNvPr id="4" name="Date Placeholder 3"/>
           <p:cNvSpPr>
             <a:spLocks noGrp="1"/>
           </p:cNvSpPr>
@@ -671,7 +597,7 @@
           <a:p>
             <a:fld id="{44E9163E-4A8E-43FD-880A-ABF77447F6CF}" type="datetimeFigureOut">
               <a:rPr lang="en-US" smtClean="0"/>
-              <a:t>9/20/2017</a:t>
+              <a:t>11/15/2017</a:t>
             </a:fld>
             <a:endParaRPr lang="en-US"/>
           </a:p>
@@ -679,13 +605,7 @@
       </p:sp>
       <p:sp>
         <p:nvSpPr>
-          <p:cNvPr id="5" name="Footer Placeholder 4">
-            <a:extLst>
-              <a:ext uri="{FF2B5EF4-FFF2-40B4-BE49-F238E27FC236}">
-                <a16:creationId xmlns:a16="http://schemas.microsoft.com/office/drawing/2014/main" id="{8E797391-59DC-4028-9EB2-FEE3E51AB621}"/>
-              </a:ext>
-            </a:extLst>
-          </p:cNvPr>
+          <p:cNvPr id="5" name="Footer Placeholder 4"/>
           <p:cNvSpPr>
             <a:spLocks noGrp="1"/>
           </p:cNvSpPr>
@@ -704,13 +624,7 @@
       </p:sp>
       <p:sp>
         <p:nvSpPr>
-          <p:cNvPr id="6" name="Slide Number Placeholder 5">
-            <a:extLst>
-              <a:ext uri="{FF2B5EF4-FFF2-40B4-BE49-F238E27FC236}">
-                <a16:creationId xmlns:a16="http://schemas.microsoft.com/office/drawing/2014/main" id="{D874DC6F-FABA-4CCA-B046-9D44622E99E1}"/>
-              </a:ext>
-            </a:extLst>
-          </p:cNvPr>
+          <p:cNvPr id="6" name="Slide Number Placeholder 5"/>
           <p:cNvSpPr>
             <a:spLocks noGrp="1"/>
           </p:cNvSpPr>
@@ -734,7 +648,7 @@
     </p:spTree>
     <p:extLst>
       <p:ext uri="{BB962C8B-B14F-4D97-AF65-F5344CB8AC3E}">
-        <p14:creationId xmlns:p14="http://schemas.microsoft.com/office/powerpoint/2010/main" val="4292796874"/>
+        <p14:creationId xmlns:p14="http://schemas.microsoft.com/office/powerpoint/2010/main" val="3322975008"/>
       </p:ext>
     </p:extLst>
   </p:cSld>
@@ -747,6 +661,30 @@
 <file path=ppt/slideLayouts/slideLayout2.xml><?xml version="1.0" encoding="utf-8"?>
 <p:sldLayout xmlns:a="http://schemas.openxmlformats.org/drawingml/2006/main" xmlns:r="http://schemas.openxmlformats.org/officeDocument/2006/relationships" xmlns:p="http://schemas.openxmlformats.org/presentationml/2006/main" type="obj" preserve="1">
   <p:cSld name="Title and Content">
+    <p:bg>
+      <p:bgPr>
+        <a:blipFill dpi="0" rotWithShape="1">
+          <a:blip r:embed="rId2">
+            <a:extLst>
+              <a:ext uri="{BEBA8EAE-BF5A-486C-A8C5-ECC9F3942E4B}">
+                <a14:imgProps xmlns:a14="http://schemas.microsoft.com/office/drawing/2010/main">
+                  <a14:imgLayer r:embed="rId3">
+                    <a14:imgEffect>
+                      <a14:brightnessContrast bright="-42000"/>
+                    </a14:imgEffect>
+                  </a14:imgLayer>
+                </a14:imgProps>
+              </a:ext>
+            </a:extLst>
+          </a:blip>
+          <a:srcRect/>
+          <a:stretch>
+            <a:fillRect t="-6000" b="-6000"/>
+          </a:stretch>
+        </a:blipFill>
+        <a:effectLst/>
+      </p:bgPr>
+    </p:bg>
     <p:spTree>
       <p:nvGrpSpPr>
         <p:cNvPr id="1" name=""/>
@@ -763,13 +701,7 @@
       </p:grpSpPr>
       <p:sp>
         <p:nvSpPr>
-          <p:cNvPr id="2" name="Title 1">
-            <a:extLst>
-              <a:ext uri="{FF2B5EF4-FFF2-40B4-BE49-F238E27FC236}">
-                <a16:creationId xmlns:a16="http://schemas.microsoft.com/office/drawing/2014/main" id="{E337C58D-09C5-476C-96EC-908F5B5D7583}"/>
-              </a:ext>
-            </a:extLst>
-          </p:cNvPr>
+          <p:cNvPr id="2" name="Title 1"/>
           <p:cNvSpPr>
             <a:spLocks noGrp="1"/>
           </p:cNvSpPr>
@@ -786,18 +718,13 @@
               <a:rPr lang="en-US"/>
               <a:t>Click to edit Master title style</a:t>
             </a:r>
-          </a:p>
-        </p:txBody>
-      </p:sp>
-      <p:sp>
-        <p:nvSpPr>
-          <p:cNvPr id="3" name="Content Placeholder 2">
-            <a:extLst>
-              <a:ext uri="{FF2B5EF4-FFF2-40B4-BE49-F238E27FC236}">
-                <a16:creationId xmlns:a16="http://schemas.microsoft.com/office/drawing/2014/main" id="{CD6EECC2-36DF-4C47-9BF5-7F483943C813}"/>
-              </a:ext>
-            </a:extLst>
-          </p:cNvPr>
+            <a:endParaRPr lang="en-US" dirty="0"/>
+          </a:p>
+        </p:txBody>
+      </p:sp>
+      <p:sp>
+        <p:nvSpPr>
+          <p:cNvPr id="3" name="Content Placeholder 2"/>
           <p:cNvSpPr>
             <a:spLocks noGrp="1"/>
           </p:cNvSpPr>
@@ -805,32 +732,47 @@
             <p:ph idx="1"/>
           </p:nvPr>
         </p:nvSpPr>
-        <p:spPr/>
+        <p:spPr>
+          <a:effectLst/>
+        </p:spPr>
         <p:txBody>
           <a:bodyPr>
             <a:normAutofit/>
           </a:bodyPr>
           <a:lstStyle>
-            <a:lvl1pPr marL="0" indent="0">
+            <a:lvl1pPr marL="0" indent="0" algn="ctr">
               <a:buNone/>
               <a:defRPr sz="4000"/>
             </a:lvl1pPr>
+            <a:lvl2pPr marL="457200" indent="0">
+              <a:buNone/>
+              <a:defRPr/>
+            </a:lvl2pPr>
+            <a:lvl3pPr marL="914400" indent="0">
+              <a:buNone/>
+              <a:defRPr/>
+            </a:lvl3pPr>
+            <a:lvl4pPr marL="1371600" indent="0">
+              <a:buNone/>
+              <a:defRPr/>
+            </a:lvl4pPr>
+            <a:lvl5pPr marL="1828800" indent="0">
+              <a:buNone/>
+              <a:defRPr/>
+            </a:lvl5pPr>
           </a:lstStyle>
           <a:p>
             <a:pPr lvl="0"/>
-            <a:endParaRPr lang="en-US" dirty="0"/>
-          </a:p>
-        </p:txBody>
-      </p:sp>
-      <p:sp>
-        <p:nvSpPr>
-          <p:cNvPr id="4" name="Date Placeholder 3">
-            <a:extLst>
-              <a:ext uri="{FF2B5EF4-FFF2-40B4-BE49-F238E27FC236}">
-                <a16:creationId xmlns:a16="http://schemas.microsoft.com/office/drawing/2014/main" id="{D24D665B-DC90-4BD2-943C-B433B98392B1}"/>
-              </a:ext>
-            </a:extLst>
-          </p:cNvPr>
+            <a:r>
+              <a:rPr lang="en-US" dirty="0"/>
+              <a:t>Edit Master text styles</a:t>
+            </a:r>
+          </a:p>
+        </p:txBody>
+      </p:sp>
+      <p:sp>
+        <p:nvSpPr>
+          <p:cNvPr id="4" name="Date Placeholder 3"/>
           <p:cNvSpPr>
             <a:spLocks noGrp="1"/>
           </p:cNvSpPr>
@@ -845,7 +787,7 @@
           <a:p>
             <a:fld id="{44E9163E-4A8E-43FD-880A-ABF77447F6CF}" type="datetimeFigureOut">
               <a:rPr lang="en-US" smtClean="0"/>
-              <a:t>9/20/2017</a:t>
+              <a:t>11/15/2017</a:t>
             </a:fld>
             <a:endParaRPr lang="en-US"/>
           </a:p>
@@ -853,13 +795,7 @@
       </p:sp>
       <p:sp>
         <p:nvSpPr>
-          <p:cNvPr id="5" name="Footer Placeholder 4">
-            <a:extLst>
-              <a:ext uri="{FF2B5EF4-FFF2-40B4-BE49-F238E27FC236}">
-                <a16:creationId xmlns:a16="http://schemas.microsoft.com/office/drawing/2014/main" id="{B3145BE1-EF84-45D7-918B-D0E2B98292FC}"/>
-              </a:ext>
-            </a:extLst>
-          </p:cNvPr>
+          <p:cNvPr id="5" name="Footer Placeholder 4"/>
           <p:cNvSpPr>
             <a:spLocks noGrp="1"/>
           </p:cNvSpPr>
@@ -878,13 +814,7 @@
       </p:sp>
       <p:sp>
         <p:nvSpPr>
-          <p:cNvPr id="6" name="Slide Number Placeholder 5">
-            <a:extLst>
-              <a:ext uri="{FF2B5EF4-FFF2-40B4-BE49-F238E27FC236}">
-                <a16:creationId xmlns:a16="http://schemas.microsoft.com/office/drawing/2014/main" id="{388E3A6C-0314-4FC4-90BD-6614B70241D7}"/>
-              </a:ext>
-            </a:extLst>
-          </p:cNvPr>
+          <p:cNvPr id="6" name="Slide Number Placeholder 5"/>
           <p:cNvSpPr>
             <a:spLocks noGrp="1"/>
           </p:cNvSpPr>
@@ -908,7 +838,7 @@
     </p:spTree>
     <p:extLst>
       <p:ext uri="{BB962C8B-B14F-4D97-AF65-F5344CB8AC3E}">
-        <p14:creationId xmlns:p14="http://schemas.microsoft.com/office/powerpoint/2010/main" val="1870007494"/>
+        <p14:creationId xmlns:p14="http://schemas.microsoft.com/office/powerpoint/2010/main" val="466498029"/>
       </p:ext>
     </p:extLst>
   </p:cSld>
@@ -937,13 +867,7 @@
       </p:grpSpPr>
       <p:sp>
         <p:nvSpPr>
-          <p:cNvPr id="2" name="Title 1">
-            <a:extLst>
-              <a:ext uri="{FF2B5EF4-FFF2-40B4-BE49-F238E27FC236}">
-                <a16:creationId xmlns:a16="http://schemas.microsoft.com/office/drawing/2014/main" id="{3E59D6C8-FEEA-4AB1-8131-5878C542A64B}"/>
-              </a:ext>
-            </a:extLst>
-          </p:cNvPr>
+          <p:cNvPr id="2" name="Title 1"/>
           <p:cNvSpPr>
             <a:spLocks noGrp="1"/>
           </p:cNvSpPr>
@@ -969,18 +893,13 @@
               <a:rPr lang="en-US"/>
               <a:t>Click to edit Master title style</a:t>
             </a:r>
-          </a:p>
-        </p:txBody>
-      </p:sp>
-      <p:sp>
-        <p:nvSpPr>
-          <p:cNvPr id="3" name="Text Placeholder 2">
-            <a:extLst>
-              <a:ext uri="{FF2B5EF4-FFF2-40B4-BE49-F238E27FC236}">
-                <a16:creationId xmlns:a16="http://schemas.microsoft.com/office/drawing/2014/main" id="{02BDF7F0-A13A-45AA-A94D-BDA96C66B3D3}"/>
-              </a:ext>
-            </a:extLst>
-          </p:cNvPr>
+            <a:endParaRPr lang="en-US" dirty="0"/>
+          </a:p>
+        </p:txBody>
+      </p:sp>
+      <p:sp>
+        <p:nvSpPr>
+          <p:cNvPr id="3" name="Text Placeholder 2"/>
           <p:cNvSpPr>
             <a:spLocks noGrp="1"/>
           </p:cNvSpPr>
@@ -1099,13 +1018,7 @@
       </p:sp>
       <p:sp>
         <p:nvSpPr>
-          <p:cNvPr id="4" name="Date Placeholder 3">
-            <a:extLst>
-              <a:ext uri="{FF2B5EF4-FFF2-40B4-BE49-F238E27FC236}">
-                <a16:creationId xmlns:a16="http://schemas.microsoft.com/office/drawing/2014/main" id="{51EA3DE7-173C-4ED3-94C1-AC98416BF681}"/>
-              </a:ext>
-            </a:extLst>
-          </p:cNvPr>
+          <p:cNvPr id="4" name="Date Placeholder 3"/>
           <p:cNvSpPr>
             <a:spLocks noGrp="1"/>
           </p:cNvSpPr>
@@ -1120,7 +1033,7 @@
           <a:p>
             <a:fld id="{44E9163E-4A8E-43FD-880A-ABF77447F6CF}" type="datetimeFigureOut">
               <a:rPr lang="en-US" smtClean="0"/>
-              <a:t>9/20/2017</a:t>
+              <a:t>11/15/2017</a:t>
             </a:fld>
             <a:endParaRPr lang="en-US"/>
           </a:p>
@@ -1128,13 +1041,7 @@
       </p:sp>
       <p:sp>
         <p:nvSpPr>
-          <p:cNvPr id="5" name="Footer Placeholder 4">
-            <a:extLst>
-              <a:ext uri="{FF2B5EF4-FFF2-40B4-BE49-F238E27FC236}">
-                <a16:creationId xmlns:a16="http://schemas.microsoft.com/office/drawing/2014/main" id="{2A9595F9-98FD-4B0F-8938-D41A4F545595}"/>
-              </a:ext>
-            </a:extLst>
-          </p:cNvPr>
+          <p:cNvPr id="5" name="Footer Placeholder 4"/>
           <p:cNvSpPr>
             <a:spLocks noGrp="1"/>
           </p:cNvSpPr>
@@ -1153,13 +1060,7 @@
       </p:sp>
       <p:sp>
         <p:nvSpPr>
-          <p:cNvPr id="6" name="Slide Number Placeholder 5">
-            <a:extLst>
-              <a:ext uri="{FF2B5EF4-FFF2-40B4-BE49-F238E27FC236}">
-                <a16:creationId xmlns:a16="http://schemas.microsoft.com/office/drawing/2014/main" id="{320EEBBF-84F7-492D-B653-00E0EAD9663E}"/>
-              </a:ext>
-            </a:extLst>
-          </p:cNvPr>
+          <p:cNvPr id="6" name="Slide Number Placeholder 5"/>
           <p:cNvSpPr>
             <a:spLocks noGrp="1"/>
           </p:cNvSpPr>
@@ -1183,7 +1084,7 @@
     </p:spTree>
     <p:extLst>
       <p:ext uri="{BB962C8B-B14F-4D97-AF65-F5344CB8AC3E}">
-        <p14:creationId xmlns:p14="http://schemas.microsoft.com/office/powerpoint/2010/main" val="1003464415"/>
+        <p14:creationId xmlns:p14="http://schemas.microsoft.com/office/powerpoint/2010/main" val="2996111692"/>
       </p:ext>
     </p:extLst>
   </p:cSld>
@@ -1212,13 +1113,7 @@
       </p:grpSpPr>
       <p:sp>
         <p:nvSpPr>
-          <p:cNvPr id="2" name="Title 1">
-            <a:extLst>
-              <a:ext uri="{FF2B5EF4-FFF2-40B4-BE49-F238E27FC236}">
-                <a16:creationId xmlns:a16="http://schemas.microsoft.com/office/drawing/2014/main" id="{766DB242-D949-492D-9333-3FFEE543DC0E}"/>
-              </a:ext>
-            </a:extLst>
-          </p:cNvPr>
+          <p:cNvPr id="2" name="Title 1"/>
           <p:cNvSpPr>
             <a:spLocks noGrp="1"/>
           </p:cNvSpPr>
@@ -1235,18 +1130,13 @@
               <a:rPr lang="en-US"/>
               <a:t>Click to edit Master title style</a:t>
             </a:r>
-          </a:p>
-        </p:txBody>
-      </p:sp>
-      <p:sp>
-        <p:nvSpPr>
-          <p:cNvPr id="3" name="Content Placeholder 2">
-            <a:extLst>
-              <a:ext uri="{FF2B5EF4-FFF2-40B4-BE49-F238E27FC236}">
-                <a16:creationId xmlns:a16="http://schemas.microsoft.com/office/drawing/2014/main" id="{DBF20A9B-1E88-4C78-ADCA-2DF16C10C83D}"/>
-              </a:ext>
-            </a:extLst>
-          </p:cNvPr>
+            <a:endParaRPr lang="en-US" dirty="0"/>
+          </a:p>
+        </p:txBody>
+      </p:sp>
+      <p:sp>
+        <p:nvSpPr>
+          <p:cNvPr id="3" name="Content Placeholder 2"/>
           <p:cNvSpPr>
             <a:spLocks noGrp="1"/>
           </p:cNvSpPr>
@@ -1297,18 +1187,13 @@
               <a:rPr lang="en-US"/>
               <a:t>Fifth level</a:t>
             </a:r>
-          </a:p>
-        </p:txBody>
-      </p:sp>
-      <p:sp>
-        <p:nvSpPr>
-          <p:cNvPr id="4" name="Content Placeholder 3">
-            <a:extLst>
-              <a:ext uri="{FF2B5EF4-FFF2-40B4-BE49-F238E27FC236}">
-                <a16:creationId xmlns:a16="http://schemas.microsoft.com/office/drawing/2014/main" id="{190F360D-8F15-44F0-9071-4F645C1D61D2}"/>
-              </a:ext>
-            </a:extLst>
-          </p:cNvPr>
+            <a:endParaRPr lang="en-US" dirty="0"/>
+          </a:p>
+        </p:txBody>
+      </p:sp>
+      <p:sp>
+        <p:nvSpPr>
+          <p:cNvPr id="4" name="Content Placeholder 3"/>
           <p:cNvSpPr>
             <a:spLocks noGrp="1"/>
           </p:cNvSpPr>
@@ -1359,18 +1244,13 @@
               <a:rPr lang="en-US"/>
               <a:t>Fifth level</a:t>
             </a:r>
-          </a:p>
-        </p:txBody>
-      </p:sp>
-      <p:sp>
-        <p:nvSpPr>
-          <p:cNvPr id="5" name="Date Placeholder 4">
-            <a:extLst>
-              <a:ext uri="{FF2B5EF4-FFF2-40B4-BE49-F238E27FC236}">
-                <a16:creationId xmlns:a16="http://schemas.microsoft.com/office/drawing/2014/main" id="{B06E4406-ED96-4A8B-BC0B-186592159615}"/>
-              </a:ext>
-            </a:extLst>
-          </p:cNvPr>
+            <a:endParaRPr lang="en-US" dirty="0"/>
+          </a:p>
+        </p:txBody>
+      </p:sp>
+      <p:sp>
+        <p:nvSpPr>
+          <p:cNvPr id="5" name="Date Placeholder 4"/>
           <p:cNvSpPr>
             <a:spLocks noGrp="1"/>
           </p:cNvSpPr>
@@ -1385,7 +1265,7 @@
           <a:p>
             <a:fld id="{44E9163E-4A8E-43FD-880A-ABF77447F6CF}" type="datetimeFigureOut">
               <a:rPr lang="en-US" smtClean="0"/>
-              <a:t>9/20/2017</a:t>
+              <a:t>11/15/2017</a:t>
             </a:fld>
             <a:endParaRPr lang="en-US"/>
           </a:p>
@@ -1393,13 +1273,7 @@
       </p:sp>
       <p:sp>
         <p:nvSpPr>
-          <p:cNvPr id="6" name="Footer Placeholder 5">
-            <a:extLst>
-              <a:ext uri="{FF2B5EF4-FFF2-40B4-BE49-F238E27FC236}">
-                <a16:creationId xmlns:a16="http://schemas.microsoft.com/office/drawing/2014/main" id="{68E96EF1-ADF7-4957-8594-798E551F3217}"/>
-              </a:ext>
-            </a:extLst>
-          </p:cNvPr>
+          <p:cNvPr id="6" name="Footer Placeholder 5"/>
           <p:cNvSpPr>
             <a:spLocks noGrp="1"/>
           </p:cNvSpPr>
@@ -1418,13 +1292,7 @@
       </p:sp>
       <p:sp>
         <p:nvSpPr>
-          <p:cNvPr id="7" name="Slide Number Placeholder 6">
-            <a:extLst>
-              <a:ext uri="{FF2B5EF4-FFF2-40B4-BE49-F238E27FC236}">
-                <a16:creationId xmlns:a16="http://schemas.microsoft.com/office/drawing/2014/main" id="{04403E69-398C-42F7-8C0E-E310164F9116}"/>
-              </a:ext>
-            </a:extLst>
-          </p:cNvPr>
+          <p:cNvPr id="7" name="Slide Number Placeholder 6"/>
           <p:cNvSpPr>
             <a:spLocks noGrp="1"/>
           </p:cNvSpPr>
@@ -1448,7 +1316,7 @@
     </p:spTree>
     <p:extLst>
       <p:ext uri="{BB962C8B-B14F-4D97-AF65-F5344CB8AC3E}">
-        <p14:creationId xmlns:p14="http://schemas.microsoft.com/office/powerpoint/2010/main" val="2832428048"/>
+        <p14:creationId xmlns:p14="http://schemas.microsoft.com/office/powerpoint/2010/main" val="2193159821"/>
       </p:ext>
     </p:extLst>
   </p:cSld>
@@ -1477,13 +1345,7 @@
       </p:grpSpPr>
       <p:sp>
         <p:nvSpPr>
-          <p:cNvPr id="2" name="Title 1">
-            <a:extLst>
-              <a:ext uri="{FF2B5EF4-FFF2-40B4-BE49-F238E27FC236}">
-                <a16:creationId xmlns:a16="http://schemas.microsoft.com/office/drawing/2014/main" id="{6DBD1064-F5C9-4F96-9DC6-72DB5794CFDF}"/>
-              </a:ext>
-            </a:extLst>
-          </p:cNvPr>
+          <p:cNvPr id="2" name="Title 1"/>
           <p:cNvSpPr>
             <a:spLocks noGrp="1"/>
           </p:cNvSpPr>
@@ -1505,18 +1367,13 @@
               <a:rPr lang="en-US"/>
               <a:t>Click to edit Master title style</a:t>
             </a:r>
-          </a:p>
-        </p:txBody>
-      </p:sp>
-      <p:sp>
-        <p:nvSpPr>
-          <p:cNvPr id="3" name="Text Placeholder 2">
-            <a:extLst>
-              <a:ext uri="{FF2B5EF4-FFF2-40B4-BE49-F238E27FC236}">
-                <a16:creationId xmlns:a16="http://schemas.microsoft.com/office/drawing/2014/main" id="{A8B3D07D-3A20-4C0E-92AB-F0260036E4BA}"/>
-              </a:ext>
-            </a:extLst>
-          </p:cNvPr>
+            <a:endParaRPr lang="en-US" dirty="0"/>
+          </a:p>
+        </p:txBody>
+      </p:sp>
+      <p:sp>
+        <p:nvSpPr>
+          <p:cNvPr id="3" name="Text Placeholder 2"/>
           <p:cNvSpPr>
             <a:spLocks noGrp="1"/>
           </p:cNvSpPr>
@@ -1581,13 +1438,7 @@
       </p:sp>
       <p:sp>
         <p:nvSpPr>
-          <p:cNvPr id="4" name="Content Placeholder 3">
-            <a:extLst>
-              <a:ext uri="{FF2B5EF4-FFF2-40B4-BE49-F238E27FC236}">
-                <a16:creationId xmlns:a16="http://schemas.microsoft.com/office/drawing/2014/main" id="{E4FBF7F6-61C6-4AA1-97BA-62411BBBF2AC}"/>
-              </a:ext>
-            </a:extLst>
-          </p:cNvPr>
+          <p:cNvPr id="4" name="Content Placeholder 3"/>
           <p:cNvSpPr>
             <a:spLocks noGrp="1"/>
           </p:cNvSpPr>
@@ -1638,18 +1489,13 @@
               <a:rPr lang="en-US"/>
               <a:t>Fifth level</a:t>
             </a:r>
-          </a:p>
-        </p:txBody>
-      </p:sp>
-      <p:sp>
-        <p:nvSpPr>
-          <p:cNvPr id="5" name="Text Placeholder 4">
-            <a:extLst>
-              <a:ext uri="{FF2B5EF4-FFF2-40B4-BE49-F238E27FC236}">
-                <a16:creationId xmlns:a16="http://schemas.microsoft.com/office/drawing/2014/main" id="{43354954-71F8-401B-B77D-AD7B579E84E3}"/>
-              </a:ext>
-            </a:extLst>
-          </p:cNvPr>
+            <a:endParaRPr lang="en-US" dirty="0"/>
+          </a:p>
+        </p:txBody>
+      </p:sp>
+      <p:sp>
+        <p:nvSpPr>
+          <p:cNvPr id="5" name="Text Placeholder 4"/>
           <p:cNvSpPr>
             <a:spLocks noGrp="1"/>
           </p:cNvSpPr>
@@ -1714,13 +1560,7 @@
       </p:sp>
       <p:sp>
         <p:nvSpPr>
-          <p:cNvPr id="6" name="Content Placeholder 5">
-            <a:extLst>
-              <a:ext uri="{FF2B5EF4-FFF2-40B4-BE49-F238E27FC236}">
-                <a16:creationId xmlns:a16="http://schemas.microsoft.com/office/drawing/2014/main" id="{6C306B65-264C-4B30-9DEE-D24C9969CAE1}"/>
-              </a:ext>
-            </a:extLst>
-          </p:cNvPr>
+          <p:cNvPr id="6" name="Content Placeholder 5"/>
           <p:cNvSpPr>
             <a:spLocks noGrp="1"/>
           </p:cNvSpPr>
@@ -1771,18 +1611,13 @@
               <a:rPr lang="en-US"/>
               <a:t>Fifth level</a:t>
             </a:r>
-          </a:p>
-        </p:txBody>
-      </p:sp>
-      <p:sp>
-        <p:nvSpPr>
-          <p:cNvPr id="7" name="Date Placeholder 6">
-            <a:extLst>
-              <a:ext uri="{FF2B5EF4-FFF2-40B4-BE49-F238E27FC236}">
-                <a16:creationId xmlns:a16="http://schemas.microsoft.com/office/drawing/2014/main" id="{EB4CD884-3683-41CD-8BB0-5505B7F0E1E7}"/>
-              </a:ext>
-            </a:extLst>
-          </p:cNvPr>
+            <a:endParaRPr lang="en-US" dirty="0"/>
+          </a:p>
+        </p:txBody>
+      </p:sp>
+      <p:sp>
+        <p:nvSpPr>
+          <p:cNvPr id="7" name="Date Placeholder 6"/>
           <p:cNvSpPr>
             <a:spLocks noGrp="1"/>
           </p:cNvSpPr>
@@ -1797,7 +1632,7 @@
           <a:p>
             <a:fld id="{44E9163E-4A8E-43FD-880A-ABF77447F6CF}" type="datetimeFigureOut">
               <a:rPr lang="en-US" smtClean="0"/>
-              <a:t>9/20/2017</a:t>
+              <a:t>11/15/2017</a:t>
             </a:fld>
             <a:endParaRPr lang="en-US"/>
           </a:p>
@@ -1805,13 +1640,7 @@
       </p:sp>
       <p:sp>
         <p:nvSpPr>
-          <p:cNvPr id="8" name="Footer Placeholder 7">
-            <a:extLst>
-              <a:ext uri="{FF2B5EF4-FFF2-40B4-BE49-F238E27FC236}">
-                <a16:creationId xmlns:a16="http://schemas.microsoft.com/office/drawing/2014/main" id="{69D766C9-8C61-4EA5-B531-F87DB5D1C8C1}"/>
-              </a:ext>
-            </a:extLst>
-          </p:cNvPr>
+          <p:cNvPr id="8" name="Footer Placeholder 7"/>
           <p:cNvSpPr>
             <a:spLocks noGrp="1"/>
           </p:cNvSpPr>
@@ -1830,13 +1659,7 @@
       </p:sp>
       <p:sp>
         <p:nvSpPr>
-          <p:cNvPr id="9" name="Slide Number Placeholder 8">
-            <a:extLst>
-              <a:ext uri="{FF2B5EF4-FFF2-40B4-BE49-F238E27FC236}">
-                <a16:creationId xmlns:a16="http://schemas.microsoft.com/office/drawing/2014/main" id="{890061E4-715A-4D17-9F78-BC46F91E4B22}"/>
-              </a:ext>
-            </a:extLst>
-          </p:cNvPr>
+          <p:cNvPr id="9" name="Slide Number Placeholder 8"/>
           <p:cNvSpPr>
             <a:spLocks noGrp="1"/>
           </p:cNvSpPr>
@@ -1860,7 +1683,7 @@
     </p:spTree>
     <p:extLst>
       <p:ext uri="{BB962C8B-B14F-4D97-AF65-F5344CB8AC3E}">
-        <p14:creationId xmlns:p14="http://schemas.microsoft.com/office/powerpoint/2010/main" val="1174576868"/>
+        <p14:creationId xmlns:p14="http://schemas.microsoft.com/office/powerpoint/2010/main" val="2840151697"/>
       </p:ext>
     </p:extLst>
   </p:cSld>
@@ -1889,13 +1712,7 @@
       </p:grpSpPr>
       <p:sp>
         <p:nvSpPr>
-          <p:cNvPr id="2" name="Title 1">
-            <a:extLst>
-              <a:ext uri="{FF2B5EF4-FFF2-40B4-BE49-F238E27FC236}">
-                <a16:creationId xmlns:a16="http://schemas.microsoft.com/office/drawing/2014/main" id="{AA5F971B-14C3-49E1-9AD1-DC51A9B7F337}"/>
-              </a:ext>
-            </a:extLst>
-          </p:cNvPr>
+          <p:cNvPr id="2" name="Title 1"/>
           <p:cNvSpPr>
             <a:spLocks noGrp="1"/>
           </p:cNvSpPr>
@@ -1912,18 +1729,13 @@
               <a:rPr lang="en-US"/>
               <a:t>Click to edit Master title style</a:t>
             </a:r>
-          </a:p>
-        </p:txBody>
-      </p:sp>
-      <p:sp>
-        <p:nvSpPr>
-          <p:cNvPr id="3" name="Date Placeholder 2">
-            <a:extLst>
-              <a:ext uri="{FF2B5EF4-FFF2-40B4-BE49-F238E27FC236}">
-                <a16:creationId xmlns:a16="http://schemas.microsoft.com/office/drawing/2014/main" id="{048FFCF8-6BDA-4ED6-B834-896E44E68A9E}"/>
-              </a:ext>
-            </a:extLst>
-          </p:cNvPr>
+            <a:endParaRPr lang="en-US" dirty="0"/>
+          </a:p>
+        </p:txBody>
+      </p:sp>
+      <p:sp>
+        <p:nvSpPr>
+          <p:cNvPr id="3" name="Date Placeholder 2"/>
           <p:cNvSpPr>
             <a:spLocks noGrp="1"/>
           </p:cNvSpPr>
@@ -1938,7 +1750,7 @@
           <a:p>
             <a:fld id="{44E9163E-4A8E-43FD-880A-ABF77447F6CF}" type="datetimeFigureOut">
               <a:rPr lang="en-US" smtClean="0"/>
-              <a:t>9/20/2017</a:t>
+              <a:t>11/15/2017</a:t>
             </a:fld>
             <a:endParaRPr lang="en-US"/>
           </a:p>
@@ -1946,13 +1758,7 @@
       </p:sp>
       <p:sp>
         <p:nvSpPr>
-          <p:cNvPr id="4" name="Footer Placeholder 3">
-            <a:extLst>
-              <a:ext uri="{FF2B5EF4-FFF2-40B4-BE49-F238E27FC236}">
-                <a16:creationId xmlns:a16="http://schemas.microsoft.com/office/drawing/2014/main" id="{6BDEC330-296F-42DB-9FB2-24AAD3EA2D06}"/>
-              </a:ext>
-            </a:extLst>
-          </p:cNvPr>
+          <p:cNvPr id="4" name="Footer Placeholder 3"/>
           <p:cNvSpPr>
             <a:spLocks noGrp="1"/>
           </p:cNvSpPr>
@@ -1971,13 +1777,7 @@
       </p:sp>
       <p:sp>
         <p:nvSpPr>
-          <p:cNvPr id="5" name="Slide Number Placeholder 4">
-            <a:extLst>
-              <a:ext uri="{FF2B5EF4-FFF2-40B4-BE49-F238E27FC236}">
-                <a16:creationId xmlns:a16="http://schemas.microsoft.com/office/drawing/2014/main" id="{59E9E76B-1BC1-4A00-8139-9D377838C343}"/>
-              </a:ext>
-            </a:extLst>
-          </p:cNvPr>
+          <p:cNvPr id="5" name="Slide Number Placeholder 4"/>
           <p:cNvSpPr>
             <a:spLocks noGrp="1"/>
           </p:cNvSpPr>
@@ -2001,7 +1801,7 @@
     </p:spTree>
     <p:extLst>
       <p:ext uri="{BB962C8B-B14F-4D97-AF65-F5344CB8AC3E}">
-        <p14:creationId xmlns:p14="http://schemas.microsoft.com/office/powerpoint/2010/main" val="4276249229"/>
+        <p14:creationId xmlns:p14="http://schemas.microsoft.com/office/powerpoint/2010/main" val="3426489040"/>
       </p:ext>
     </p:extLst>
   </p:cSld>
@@ -2030,13 +1830,7 @@
       </p:grpSpPr>
       <p:sp>
         <p:nvSpPr>
-          <p:cNvPr id="2" name="Date Placeholder 1">
-            <a:extLst>
-              <a:ext uri="{FF2B5EF4-FFF2-40B4-BE49-F238E27FC236}">
-                <a16:creationId xmlns:a16="http://schemas.microsoft.com/office/drawing/2014/main" id="{2ED47952-CE78-458B-AAB3-B96B13B0667A}"/>
-              </a:ext>
-            </a:extLst>
-          </p:cNvPr>
+          <p:cNvPr id="2" name="Date Placeholder 1"/>
           <p:cNvSpPr>
             <a:spLocks noGrp="1"/>
           </p:cNvSpPr>
@@ -2051,7 +1845,7 @@
           <a:p>
             <a:fld id="{44E9163E-4A8E-43FD-880A-ABF77447F6CF}" type="datetimeFigureOut">
               <a:rPr lang="en-US" smtClean="0"/>
-              <a:t>9/20/2017</a:t>
+              <a:t>11/15/2017</a:t>
             </a:fld>
             <a:endParaRPr lang="en-US"/>
           </a:p>
@@ -2059,13 +1853,7 @@
       </p:sp>
       <p:sp>
         <p:nvSpPr>
-          <p:cNvPr id="3" name="Footer Placeholder 2">
-            <a:extLst>
-              <a:ext uri="{FF2B5EF4-FFF2-40B4-BE49-F238E27FC236}">
-                <a16:creationId xmlns:a16="http://schemas.microsoft.com/office/drawing/2014/main" id="{78E47EA5-45D0-4235-A7DE-DDDD95AFDD6E}"/>
-              </a:ext>
-            </a:extLst>
-          </p:cNvPr>
+          <p:cNvPr id="3" name="Footer Placeholder 2"/>
           <p:cNvSpPr>
             <a:spLocks noGrp="1"/>
           </p:cNvSpPr>
@@ -2084,13 +1872,7 @@
       </p:sp>
       <p:sp>
         <p:nvSpPr>
-          <p:cNvPr id="4" name="Slide Number Placeholder 3">
-            <a:extLst>
-              <a:ext uri="{FF2B5EF4-FFF2-40B4-BE49-F238E27FC236}">
-                <a16:creationId xmlns:a16="http://schemas.microsoft.com/office/drawing/2014/main" id="{7860B1EA-19A3-471A-9CDB-8626B664D24A}"/>
-              </a:ext>
-            </a:extLst>
-          </p:cNvPr>
+          <p:cNvPr id="4" name="Slide Number Placeholder 3"/>
           <p:cNvSpPr>
             <a:spLocks noGrp="1"/>
           </p:cNvSpPr>
@@ -2114,7 +1896,7 @@
     </p:spTree>
     <p:extLst>
       <p:ext uri="{BB962C8B-B14F-4D97-AF65-F5344CB8AC3E}">
-        <p14:creationId xmlns:p14="http://schemas.microsoft.com/office/powerpoint/2010/main" val="4008186423"/>
+        <p14:creationId xmlns:p14="http://schemas.microsoft.com/office/powerpoint/2010/main" val="3362962097"/>
       </p:ext>
     </p:extLst>
   </p:cSld>
@@ -2143,13 +1925,7 @@
       </p:grpSpPr>
       <p:sp>
         <p:nvSpPr>
-          <p:cNvPr id="2" name="Title 1">
-            <a:extLst>
-              <a:ext uri="{FF2B5EF4-FFF2-40B4-BE49-F238E27FC236}">
-                <a16:creationId xmlns:a16="http://schemas.microsoft.com/office/drawing/2014/main" id="{A3B9A03E-59E2-4571-991F-CC677E51037F}"/>
-              </a:ext>
-            </a:extLst>
-          </p:cNvPr>
+          <p:cNvPr id="2" name="Title 1"/>
           <p:cNvSpPr>
             <a:spLocks noGrp="1"/>
           </p:cNvSpPr>
@@ -2175,18 +1951,13 @@
               <a:rPr lang="en-US"/>
               <a:t>Click to edit Master title style</a:t>
             </a:r>
-          </a:p>
-        </p:txBody>
-      </p:sp>
-      <p:sp>
-        <p:nvSpPr>
-          <p:cNvPr id="3" name="Content Placeholder 2">
-            <a:extLst>
-              <a:ext uri="{FF2B5EF4-FFF2-40B4-BE49-F238E27FC236}">
-                <a16:creationId xmlns:a16="http://schemas.microsoft.com/office/drawing/2014/main" id="{1A5DA454-D414-4B9F-B992-339A74F43491}"/>
-              </a:ext>
-            </a:extLst>
-          </p:cNvPr>
+            <a:endParaRPr lang="en-US" dirty="0"/>
+          </a:p>
+        </p:txBody>
+      </p:sp>
+      <p:sp>
+        <p:nvSpPr>
+          <p:cNvPr id="3" name="Content Placeholder 2"/>
           <p:cNvSpPr>
             <a:spLocks noGrp="1"/>
           </p:cNvSpPr>
@@ -2265,18 +2036,13 @@
               <a:rPr lang="en-US"/>
               <a:t>Fifth level</a:t>
             </a:r>
-          </a:p>
-        </p:txBody>
-      </p:sp>
-      <p:sp>
-        <p:nvSpPr>
-          <p:cNvPr id="4" name="Text Placeholder 3">
-            <a:extLst>
-              <a:ext uri="{FF2B5EF4-FFF2-40B4-BE49-F238E27FC236}">
-                <a16:creationId xmlns:a16="http://schemas.microsoft.com/office/drawing/2014/main" id="{503F0AEA-468D-4B36-BA94-58608AE19A62}"/>
-              </a:ext>
-            </a:extLst>
-          </p:cNvPr>
+            <a:endParaRPr lang="en-US" dirty="0"/>
+          </a:p>
+        </p:txBody>
+      </p:sp>
+      <p:sp>
+        <p:nvSpPr>
+          <p:cNvPr id="4" name="Text Placeholder 3"/>
           <p:cNvSpPr>
             <a:spLocks noGrp="1"/>
           </p:cNvSpPr>
@@ -2341,13 +2107,7 @@
       </p:sp>
       <p:sp>
         <p:nvSpPr>
-          <p:cNvPr id="5" name="Date Placeholder 4">
-            <a:extLst>
-              <a:ext uri="{FF2B5EF4-FFF2-40B4-BE49-F238E27FC236}">
-                <a16:creationId xmlns:a16="http://schemas.microsoft.com/office/drawing/2014/main" id="{2DCB41A3-F187-4281-BF38-F8180BC8CBDD}"/>
-              </a:ext>
-            </a:extLst>
-          </p:cNvPr>
+          <p:cNvPr id="5" name="Date Placeholder 4"/>
           <p:cNvSpPr>
             <a:spLocks noGrp="1"/>
           </p:cNvSpPr>
@@ -2362,7 +2122,7 @@
           <a:p>
             <a:fld id="{44E9163E-4A8E-43FD-880A-ABF77447F6CF}" type="datetimeFigureOut">
               <a:rPr lang="en-US" smtClean="0"/>
-              <a:t>9/20/2017</a:t>
+              <a:t>11/15/2017</a:t>
             </a:fld>
             <a:endParaRPr lang="en-US"/>
           </a:p>
@@ -2370,13 +2130,7 @@
       </p:sp>
       <p:sp>
         <p:nvSpPr>
-          <p:cNvPr id="6" name="Footer Placeholder 5">
-            <a:extLst>
-              <a:ext uri="{FF2B5EF4-FFF2-40B4-BE49-F238E27FC236}">
-                <a16:creationId xmlns:a16="http://schemas.microsoft.com/office/drawing/2014/main" id="{B4D46B00-567A-46CD-96AE-F476C41A32BA}"/>
-              </a:ext>
-            </a:extLst>
-          </p:cNvPr>
+          <p:cNvPr id="6" name="Footer Placeholder 5"/>
           <p:cNvSpPr>
             <a:spLocks noGrp="1"/>
           </p:cNvSpPr>
@@ -2395,13 +2149,7 @@
       </p:sp>
       <p:sp>
         <p:nvSpPr>
-          <p:cNvPr id="7" name="Slide Number Placeholder 6">
-            <a:extLst>
-              <a:ext uri="{FF2B5EF4-FFF2-40B4-BE49-F238E27FC236}">
-                <a16:creationId xmlns:a16="http://schemas.microsoft.com/office/drawing/2014/main" id="{25C44CA4-F7A7-4A6E-800B-F9A1DAFB8A46}"/>
-              </a:ext>
-            </a:extLst>
-          </p:cNvPr>
+          <p:cNvPr id="7" name="Slide Number Placeholder 6"/>
           <p:cNvSpPr>
             <a:spLocks noGrp="1"/>
           </p:cNvSpPr>
@@ -2425,7 +2173,7 @@
     </p:spTree>
     <p:extLst>
       <p:ext uri="{BB962C8B-B14F-4D97-AF65-F5344CB8AC3E}">
-        <p14:creationId xmlns:p14="http://schemas.microsoft.com/office/powerpoint/2010/main" val="530207907"/>
+        <p14:creationId xmlns:p14="http://schemas.microsoft.com/office/powerpoint/2010/main" val="1715328739"/>
       </p:ext>
     </p:extLst>
   </p:cSld>
@@ -2454,13 +2202,7 @@
       </p:grpSpPr>
       <p:sp>
         <p:nvSpPr>
-          <p:cNvPr id="2" name="Title 1">
-            <a:extLst>
-              <a:ext uri="{FF2B5EF4-FFF2-40B4-BE49-F238E27FC236}">
-                <a16:creationId xmlns:a16="http://schemas.microsoft.com/office/drawing/2014/main" id="{01575C1B-2B5B-457D-800A-CFAD120F081D}"/>
-              </a:ext>
-            </a:extLst>
-          </p:cNvPr>
+          <p:cNvPr id="2" name="Title 1"/>
           <p:cNvSpPr>
             <a:spLocks noGrp="1"/>
           </p:cNvSpPr>
@@ -2486,20 +2228,15 @@
               <a:rPr lang="en-US"/>
               <a:t>Click to edit Master title style</a:t>
             </a:r>
-          </a:p>
-        </p:txBody>
-      </p:sp>
-      <p:sp>
-        <p:nvSpPr>
-          <p:cNvPr id="3" name="Picture Placeholder 2">
-            <a:extLst>
-              <a:ext uri="{FF2B5EF4-FFF2-40B4-BE49-F238E27FC236}">
-                <a16:creationId xmlns:a16="http://schemas.microsoft.com/office/drawing/2014/main" id="{B472C766-4AC2-4201-B431-701890EDD058}"/>
-              </a:ext>
-            </a:extLst>
-          </p:cNvPr>
-          <p:cNvSpPr>
-            <a:spLocks noGrp="1"/>
+            <a:endParaRPr lang="en-US" dirty="0"/>
+          </a:p>
+        </p:txBody>
+      </p:sp>
+      <p:sp>
+        <p:nvSpPr>
+          <p:cNvPr id="3" name="Picture Placeholder 2"/>
+          <p:cNvSpPr>
+            <a:spLocks noGrp="1" noChangeAspect="1"/>
           </p:cNvSpPr>
           <p:nvPr>
             <p:ph type="pic" idx="1"/>
@@ -2512,7 +2249,7 @@
           </a:xfrm>
         </p:spPr>
         <p:txBody>
-          <a:bodyPr/>
+          <a:bodyPr anchor="t"/>
           <a:lstStyle>
             <a:lvl1pPr marL="0" indent="0">
               <a:buNone/>
@@ -2552,19 +2289,17 @@
             </a:lvl9pPr>
           </a:lstStyle>
           <a:p>
-            <a:endParaRPr lang="en-US"/>
-          </a:p>
-        </p:txBody>
-      </p:sp>
-      <p:sp>
-        <p:nvSpPr>
-          <p:cNvPr id="4" name="Text Placeholder 3">
-            <a:extLst>
-              <a:ext uri="{FF2B5EF4-FFF2-40B4-BE49-F238E27FC236}">
-                <a16:creationId xmlns:a16="http://schemas.microsoft.com/office/drawing/2014/main" id="{A660F6D6-DDC4-4257-82AB-7730D3ECB8DF}"/>
-              </a:ext>
-            </a:extLst>
-          </p:cNvPr>
+            <a:r>
+              <a:rPr lang="en-US"/>
+              <a:t>Click icon to add picture</a:t>
+            </a:r>
+            <a:endParaRPr lang="en-US" dirty="0"/>
+          </a:p>
+        </p:txBody>
+      </p:sp>
+      <p:sp>
+        <p:nvSpPr>
+          <p:cNvPr id="4" name="Text Placeholder 3"/>
           <p:cNvSpPr>
             <a:spLocks noGrp="1"/>
           </p:cNvSpPr>
@@ -2629,13 +2364,7 @@
       </p:sp>
       <p:sp>
         <p:nvSpPr>
-          <p:cNvPr id="5" name="Date Placeholder 4">
-            <a:extLst>
-              <a:ext uri="{FF2B5EF4-FFF2-40B4-BE49-F238E27FC236}">
-                <a16:creationId xmlns:a16="http://schemas.microsoft.com/office/drawing/2014/main" id="{B05B9C31-2641-406E-B6A6-F6C261983E01}"/>
-              </a:ext>
-            </a:extLst>
-          </p:cNvPr>
+          <p:cNvPr id="5" name="Date Placeholder 4"/>
           <p:cNvSpPr>
             <a:spLocks noGrp="1"/>
           </p:cNvSpPr>
@@ -2650,7 +2379,7 @@
           <a:p>
             <a:fld id="{44E9163E-4A8E-43FD-880A-ABF77447F6CF}" type="datetimeFigureOut">
               <a:rPr lang="en-US" smtClean="0"/>
-              <a:t>9/20/2017</a:t>
+              <a:t>11/15/2017</a:t>
             </a:fld>
             <a:endParaRPr lang="en-US"/>
           </a:p>
@@ -2658,13 +2387,7 @@
       </p:sp>
       <p:sp>
         <p:nvSpPr>
-          <p:cNvPr id="6" name="Footer Placeholder 5">
-            <a:extLst>
-              <a:ext uri="{FF2B5EF4-FFF2-40B4-BE49-F238E27FC236}">
-                <a16:creationId xmlns:a16="http://schemas.microsoft.com/office/drawing/2014/main" id="{17C49654-90A5-41F8-92A4-C826B8F22F08}"/>
-              </a:ext>
-            </a:extLst>
-          </p:cNvPr>
+          <p:cNvPr id="6" name="Footer Placeholder 5"/>
           <p:cNvSpPr>
             <a:spLocks noGrp="1"/>
           </p:cNvSpPr>
@@ -2683,13 +2406,7 @@
       </p:sp>
       <p:sp>
         <p:nvSpPr>
-          <p:cNvPr id="7" name="Slide Number Placeholder 6">
-            <a:extLst>
-              <a:ext uri="{FF2B5EF4-FFF2-40B4-BE49-F238E27FC236}">
-                <a16:creationId xmlns:a16="http://schemas.microsoft.com/office/drawing/2014/main" id="{5A5F32B7-6848-43C8-A2CD-CA0BB384B5DA}"/>
-              </a:ext>
-            </a:extLst>
-          </p:cNvPr>
+          <p:cNvPr id="7" name="Slide Number Placeholder 6"/>
           <p:cNvSpPr>
             <a:spLocks noGrp="1"/>
           </p:cNvSpPr>
@@ -2713,7 +2430,7 @@
     </p:spTree>
     <p:extLst>
       <p:ext uri="{BB962C8B-B14F-4D97-AF65-F5344CB8AC3E}">
-        <p14:creationId xmlns:p14="http://schemas.microsoft.com/office/powerpoint/2010/main" val="3104961410"/>
+        <p14:creationId xmlns:p14="http://schemas.microsoft.com/office/powerpoint/2010/main" val="2012170761"/>
       </p:ext>
     </p:extLst>
   </p:cSld>
@@ -2747,13 +2464,7 @@
       </p:grpSpPr>
       <p:sp>
         <p:nvSpPr>
-          <p:cNvPr id="2" name="Title Placeholder 1">
-            <a:extLst>
-              <a:ext uri="{FF2B5EF4-FFF2-40B4-BE49-F238E27FC236}">
-                <a16:creationId xmlns:a16="http://schemas.microsoft.com/office/drawing/2014/main" id="{420D1744-BE89-4F2D-BFED-95F117D7EF13}"/>
-              </a:ext>
-            </a:extLst>
-          </p:cNvPr>
+          <p:cNvPr id="2" name="Title Placeholder 1"/>
           <p:cNvSpPr>
             <a:spLocks noGrp="1"/>
           </p:cNvSpPr>
@@ -2780,18 +2491,13 @@
               <a:rPr lang="en-US"/>
               <a:t>Click to edit Master title style</a:t>
             </a:r>
-          </a:p>
-        </p:txBody>
-      </p:sp>
-      <p:sp>
-        <p:nvSpPr>
-          <p:cNvPr id="3" name="Text Placeholder 2">
-            <a:extLst>
-              <a:ext uri="{FF2B5EF4-FFF2-40B4-BE49-F238E27FC236}">
-                <a16:creationId xmlns:a16="http://schemas.microsoft.com/office/drawing/2014/main" id="{F4D6C5F8-737A-4BC4-A8D6-9345E3304291}"/>
-              </a:ext>
-            </a:extLst>
-          </p:cNvPr>
+            <a:endParaRPr lang="en-US" dirty="0"/>
+          </a:p>
+        </p:txBody>
+      </p:sp>
+      <p:sp>
+        <p:nvSpPr>
+          <p:cNvPr id="3" name="Text Placeholder 2"/>
           <p:cNvSpPr>
             <a:spLocks noGrp="1"/>
           </p:cNvSpPr>
@@ -2847,18 +2553,13 @@
               <a:rPr lang="en-US"/>
               <a:t>Fifth level</a:t>
             </a:r>
-          </a:p>
-        </p:txBody>
-      </p:sp>
-      <p:sp>
-        <p:nvSpPr>
-          <p:cNvPr id="4" name="Date Placeholder 3">
-            <a:extLst>
-              <a:ext uri="{FF2B5EF4-FFF2-40B4-BE49-F238E27FC236}">
-                <a16:creationId xmlns:a16="http://schemas.microsoft.com/office/drawing/2014/main" id="{285C60BC-F0DF-4470-B7B2-5820951CE876}"/>
-              </a:ext>
-            </a:extLst>
-          </p:cNvPr>
+            <a:endParaRPr lang="en-US" dirty="0"/>
+          </a:p>
+        </p:txBody>
+      </p:sp>
+      <p:sp>
+        <p:nvSpPr>
+          <p:cNvPr id="4" name="Date Placeholder 3"/>
           <p:cNvSpPr>
             <a:spLocks noGrp="1"/>
           </p:cNvSpPr>
@@ -2891,7 +2592,7 @@
           <a:p>
             <a:fld id="{44E9163E-4A8E-43FD-880A-ABF77447F6CF}" type="datetimeFigureOut">
               <a:rPr lang="en-US" smtClean="0"/>
-              <a:t>9/20/2017</a:t>
+              <a:t>11/15/2017</a:t>
             </a:fld>
             <a:endParaRPr lang="en-US"/>
           </a:p>
@@ -2899,13 +2600,7 @@
       </p:sp>
       <p:sp>
         <p:nvSpPr>
-          <p:cNvPr id="5" name="Footer Placeholder 4">
-            <a:extLst>
-              <a:ext uri="{FF2B5EF4-FFF2-40B4-BE49-F238E27FC236}">
-                <a16:creationId xmlns:a16="http://schemas.microsoft.com/office/drawing/2014/main" id="{3359830B-782F-476B-AD04-9AA6D7EA9BF8}"/>
-              </a:ext>
-            </a:extLst>
-          </p:cNvPr>
+          <p:cNvPr id="5" name="Footer Placeholder 4"/>
           <p:cNvSpPr>
             <a:spLocks noGrp="1"/>
           </p:cNvSpPr>
@@ -2942,13 +2637,7 @@
       </p:sp>
       <p:sp>
         <p:nvSpPr>
-          <p:cNvPr id="6" name="Slide Number Placeholder 5">
-            <a:extLst>
-              <a:ext uri="{FF2B5EF4-FFF2-40B4-BE49-F238E27FC236}">
-                <a16:creationId xmlns:a16="http://schemas.microsoft.com/office/drawing/2014/main" id="{F43AB2B4-D277-4AA3-AFCB-69FF3466FE62}"/>
-              </a:ext>
-            </a:extLst>
-          </p:cNvPr>
+          <p:cNvPr id="6" name="Slide Number Placeholder 5"/>
           <p:cNvSpPr>
             <a:spLocks noGrp="1"/>
           </p:cNvSpPr>
@@ -2990,23 +2679,23 @@
     </p:spTree>
     <p:extLst>
       <p:ext uri="{BB962C8B-B14F-4D97-AF65-F5344CB8AC3E}">
-        <p14:creationId xmlns:p14="http://schemas.microsoft.com/office/powerpoint/2010/main" val="2511489898"/>
+        <p14:creationId xmlns:p14="http://schemas.microsoft.com/office/powerpoint/2010/main" val="3456268324"/>
       </p:ext>
     </p:extLst>
   </p:cSld>
-  <p:clrMap bg1="lt1" tx1="dk1" bg2="lt2" tx2="dk2" accent1="accent1" accent2="accent2" accent3="accent3" accent4="accent4" accent5="accent5" accent6="accent6" hlink="hlink" folHlink="folHlink"/>
+  <p:clrMap bg1="dk1" tx1="lt1" bg2="dk2" tx2="lt2" accent1="accent1" accent2="accent2" accent3="accent3" accent4="accent4" accent5="accent5" accent6="accent6" hlink="hlink" folHlink="folHlink"/>
   <p:sldLayoutIdLst>
-    <p:sldLayoutId id="2147483649" r:id="rId1"/>
-    <p:sldLayoutId id="2147483650" r:id="rId2"/>
-    <p:sldLayoutId id="2147483651" r:id="rId3"/>
-    <p:sldLayoutId id="2147483652" r:id="rId4"/>
-    <p:sldLayoutId id="2147483653" r:id="rId5"/>
-    <p:sldLayoutId id="2147483654" r:id="rId6"/>
-    <p:sldLayoutId id="2147483655" r:id="rId7"/>
-    <p:sldLayoutId id="2147483656" r:id="rId8"/>
-    <p:sldLayoutId id="2147483657" r:id="rId9"/>
-    <p:sldLayoutId id="2147483658" r:id="rId10"/>
-    <p:sldLayoutId id="2147483659" r:id="rId11"/>
+    <p:sldLayoutId id="2147483685" r:id="rId1"/>
+    <p:sldLayoutId id="2147483686" r:id="rId2"/>
+    <p:sldLayoutId id="2147483687" r:id="rId3"/>
+    <p:sldLayoutId id="2147483688" r:id="rId4"/>
+    <p:sldLayoutId id="2147483689" r:id="rId5"/>
+    <p:sldLayoutId id="2147483690" r:id="rId6"/>
+    <p:sldLayoutId id="2147483691" r:id="rId7"/>
+    <p:sldLayoutId id="2147483692" r:id="rId8"/>
+    <p:sldLayoutId id="2147483693" r:id="rId9"/>
+    <p:sldLayoutId id="2147483694" r:id="rId10"/>
+    <p:sldLayoutId id="2147483695" r:id="rId11"/>
   </p:sldLayoutIdLst>
   <p:txStyles>
     <p:titleStyle>
@@ -3294,6 +2983,14 @@
 <file path=ppt/slides/slide1.xml><?xml version="1.0" encoding="utf-8"?>
 <p:sld xmlns:a="http://schemas.openxmlformats.org/drawingml/2006/main" xmlns:r="http://schemas.openxmlformats.org/officeDocument/2006/relationships" xmlns:p="http://schemas.openxmlformats.org/presentationml/2006/main">
   <p:cSld>
+    <p:bg>
+      <p:bgPr>
+        <a:solidFill>
+          <a:schemeClr val="bg1"/>
+        </a:solidFill>
+        <a:effectLst/>
+      </p:bgPr>
+    </p:bg>
     <p:spTree>
       <p:nvGrpSpPr>
         <p:cNvPr id="1" name=""/>
@@ -3310,6 +3007,98 @@
       </p:grpSpPr>
       <p:sp>
         <p:nvSpPr>
+          <p:cNvPr id="9" name="Rectangle 8">
+            <a:extLst>
+              <a:ext uri="{FF2B5EF4-FFF2-40B4-BE49-F238E27FC236}">
+                <a16:creationId xmlns:a16="http://schemas.microsoft.com/office/drawing/2014/main" id="{279B278B-A966-4E2B-832D-0DF4FBE1FE00}"/>
+              </a:ext>
+            </a:extLst>
+          </p:cNvPr>
+          <p:cNvSpPr>
+            <a:spLocks noGrp="1" noRot="1" noChangeAspect="1" noMove="1" noResize="1" noEditPoints="1" noAdjustHandles="1" noChangeArrowheads="1" noChangeShapeType="1" noTextEdit="1"/>
+          </p:cNvSpPr>
+          <p:nvPr>
+            <p:extLst>
+              <p:ext uri="{386F3935-93C4-4BCD-93E2-E3B085C9AB24}">
+                <p16:designElem xmlns:p16="http://schemas.microsoft.com/office/powerpoint/2015/main" val="1"/>
+              </p:ext>
+            </p:extLst>
+          </p:nvPr>
+        </p:nvSpPr>
+        <p:spPr>
+          <a:xfrm>
+            <a:off x="0" y="0"/>
+            <a:ext cx="12192000" cy="6858000"/>
+          </a:xfrm>
+          <a:prstGeom prst="rect">
+            <a:avLst/>
+          </a:prstGeom>
+          <a:solidFill>
+            <a:srgbClr val="000000"/>
+          </a:solidFill>
+          <a:ln>
+            <a:noFill/>
+          </a:ln>
+        </p:spPr>
+        <p:style>
+          <a:lnRef idx="2">
+            <a:schemeClr val="accent1">
+              <a:shade val="50000"/>
+            </a:schemeClr>
+          </a:lnRef>
+          <a:fillRef idx="1">
+            <a:schemeClr val="accent1"/>
+          </a:fillRef>
+          <a:effectRef idx="0">
+            <a:schemeClr val="accent1"/>
+          </a:effectRef>
+          <a:fontRef idx="minor">
+            <a:schemeClr val="lt1"/>
+          </a:fontRef>
+        </p:style>
+        <p:txBody>
+          <a:bodyPr rtlCol="0" anchor="ctr"/>
+          <a:lstStyle/>
+          <a:p>
+            <a:pPr algn="ctr"/>
+            <a:endParaRPr lang="en-US"/>
+          </a:p>
+        </p:txBody>
+      </p:sp>
+      <p:pic>
+        <p:nvPicPr>
+          <p:cNvPr id="4" name="Picture 3">
+            <a:extLst>
+              <a:ext uri="{FF2B5EF4-FFF2-40B4-BE49-F238E27FC236}">
+                <a16:creationId xmlns:a16="http://schemas.microsoft.com/office/drawing/2014/main" id="{8DBDEF5D-6B15-4436-AA77-145753A0B21D}"/>
+              </a:ext>
+            </a:extLst>
+          </p:cNvPr>
+          <p:cNvPicPr>
+            <a:picLocks noChangeAspect="1"/>
+          </p:cNvPicPr>
+          <p:nvPr/>
+        </p:nvPicPr>
+        <p:blipFill rotWithShape="1">
+          <a:blip r:embed="rId2">
+            <a:alphaModFix amt="50000"/>
+            <a:extLst/>
+          </a:blip>
+          <a:srcRect t="3631" b="6369"/>
+          <a:stretch/>
+        </p:blipFill>
+        <p:spPr>
+          <a:xfrm>
+            <a:off x="20" y="10"/>
+            <a:ext cx="12191980" cy="6857989"/>
+          </a:xfrm>
+          <a:prstGeom prst="rect">
+            <a:avLst/>
+          </a:prstGeom>
+        </p:spPr>
+      </p:pic>
+      <p:sp>
+        <p:nvSpPr>
           <p:cNvPr id="2" name="Title 1">
             <a:extLst>
               <a:ext uri="{FF2B5EF4-FFF2-40B4-BE49-F238E27FC236}">
@@ -3324,12 +3113,23 @@
             <p:ph type="ctrTitle"/>
           </p:nvPr>
         </p:nvSpPr>
-        <p:spPr/>
-        <p:txBody>
-          <a:bodyPr/>
-          <a:lstStyle/>
-          <a:p>
-            <a:endParaRPr lang="en-US"/>
+        <p:spPr>
+          <a:xfrm>
+            <a:off x="1524000" y="1122363"/>
+            <a:ext cx="9144000" cy="2387600"/>
+          </a:xfrm>
+        </p:spPr>
+        <p:txBody>
+          <a:bodyPr>
+            <a:normAutofit/>
+          </a:bodyPr>
+          <a:lstStyle/>
+          <a:p>
+            <a:endParaRPr lang="en-US">
+              <a:solidFill>
+                <a:srgbClr val="FFFFFF"/>
+              </a:solidFill>
+            </a:endParaRPr>
           </a:p>
         </p:txBody>
       </p:sp>
@@ -3349,12 +3149,23 @@
             <p:ph type="subTitle" idx="1"/>
           </p:nvPr>
         </p:nvSpPr>
-        <p:spPr/>
-        <p:txBody>
-          <a:bodyPr/>
-          <a:lstStyle/>
-          <a:p>
-            <a:endParaRPr lang="en-US"/>
+        <p:spPr>
+          <a:xfrm>
+            <a:off x="1524000" y="3602038"/>
+            <a:ext cx="9144000" cy="1655762"/>
+          </a:xfrm>
+        </p:spPr>
+        <p:txBody>
+          <a:bodyPr>
+            <a:normAutofit/>
+          </a:bodyPr>
+          <a:lstStyle/>
+          <a:p>
+            <a:endParaRPr lang="en-US">
+              <a:solidFill>
+                <a:srgbClr val="FFFFFF"/>
+              </a:solidFill>
+            </a:endParaRPr>
           </a:p>
         </p:txBody>
       </p:sp>
@@ -3374,7 +3185,7 @@
 <file path=ppt/theme/theme1.xml><?xml version="1.0" encoding="utf-8"?>
 <a:theme xmlns:a="http://schemas.openxmlformats.org/drawingml/2006/main" name="Office Theme">
   <a:themeElements>
-    <a:clrScheme name="Office">
+    <a:clrScheme name="Office Theme">
       <a:dk1>
         <a:sysClr val="windowText" lastClr="000000"/>
       </a:dk1>
@@ -3412,7 +3223,7 @@
         <a:srgbClr val="954F72"/>
       </a:folHlink>
     </a:clrScheme>
-    <a:fontScheme name="Office">
+    <a:fontScheme name="Office Theme">
       <a:majorFont>
         <a:latin typeface="Calibri Light" panose="020F0302020204030204"/>
         <a:ea typeface=""/>
@@ -3447,23 +3258,6 @@
         <a:font script="Viet" typeface="Times New Roman"/>
         <a:font script="Uigh" typeface="Microsoft Uighur"/>
         <a:font script="Geor" typeface="Sylfaen"/>
-        <a:font script="Armn" typeface="Arial"/>
-        <a:font script="Bugi" typeface="Leelawadee UI"/>
-        <a:font script="Bopo" typeface="Microsoft JhengHei"/>
-        <a:font script="Java" typeface="Javanese Text"/>
-        <a:font script="Lisu" typeface="Segoe UI"/>
-        <a:font script="Mymr" typeface="Myanmar Text"/>
-        <a:font script="Nkoo" typeface="Ebrima"/>
-        <a:font script="Olck" typeface="Nirmala UI"/>
-        <a:font script="Osma" typeface="Ebrima"/>
-        <a:font script="Phag" typeface="Phagspa"/>
-        <a:font script="Syrn" typeface="Estrangelo Edessa"/>
-        <a:font script="Syrj" typeface="Estrangelo Edessa"/>
-        <a:font script="Syre" typeface="Estrangelo Edessa"/>
-        <a:font script="Sora" typeface="Nirmala UI"/>
-        <a:font script="Tale" typeface="Microsoft Tai Le"/>
-        <a:font script="Talu" typeface="Microsoft New Tai Lue"/>
-        <a:font script="Tfng" typeface="Ebrima"/>
       </a:majorFont>
       <a:minorFont>
         <a:latin typeface="Calibri" panose="020F0502020204030204"/>
@@ -3499,26 +3293,9 @@
         <a:font script="Viet" typeface="Arial"/>
         <a:font script="Uigh" typeface="Microsoft Uighur"/>
         <a:font script="Geor" typeface="Sylfaen"/>
-        <a:font script="Armn" typeface="Arial"/>
-        <a:font script="Bugi" typeface="Leelawadee UI"/>
-        <a:font script="Bopo" typeface="Microsoft JhengHei"/>
-        <a:font script="Java" typeface="Javanese Text"/>
-        <a:font script="Lisu" typeface="Segoe UI"/>
-        <a:font script="Mymr" typeface="Myanmar Text"/>
-        <a:font script="Nkoo" typeface="Ebrima"/>
-        <a:font script="Olck" typeface="Nirmala UI"/>
-        <a:font script="Osma" typeface="Ebrima"/>
-        <a:font script="Phag" typeface="Phagspa"/>
-        <a:font script="Syrn" typeface="Estrangelo Edessa"/>
-        <a:font script="Syrj" typeface="Estrangelo Edessa"/>
-        <a:font script="Syre" typeface="Estrangelo Edessa"/>
-        <a:font script="Sora" typeface="Nirmala UI"/>
-        <a:font script="Tale" typeface="Microsoft Tai Le"/>
-        <a:font script="Talu" typeface="Microsoft New Tai Lue"/>
-        <a:font script="Tfng" typeface="Ebrima"/>
       </a:minorFont>
     </a:fontScheme>
-    <a:fmtScheme name="Office">
+    <a:fmtScheme name="Office Theme">
       <a:fillStyleLst>
         <a:solidFill>
           <a:schemeClr val="phClr"/>
@@ -3660,7 +3437,7 @@
   <a:extraClrSchemeLst/>
   <a:extLst>
     <a:ext uri="{05A4C25C-085E-4340-85A3-A5531E510DB2}">
-      <thm15:themeFamily xmlns:thm15="http://schemas.microsoft.com/office/thememl/2012/main" name="Office Theme" id="{62F939B6-93AF-4DB8-9C6B-D6C7DFDC589F}" vid="{4A3C46E8-61CC-4603-A589-7422A47A8E4A}"/>
+      <thm15:themeFamily xmlns:thm15="http://schemas.microsoft.com/office/thememl/2012/main" name="Office Theme" id="{62F939B6-93AF-4DB8-9C6B-D6C7DFDC589F}" vid="{4F46216B-77A9-411A-B9D3-5023FCB70208}"/>
     </a:ext>
   </a:extLst>
 </a:theme>

</xml_diff>